<commit_message>
add final slides, fix formatting
</commit_message>
<xml_diff>
--- a/scalamsg/Scalamsg.pptx
+++ b/scalamsg/Scalamsg.pptx
@@ -9773,13 +9773,9 @@
           <a:p>
             <a:r>
               <a:rPr lang="pl-PL" dirty="0" smtClean="0"/>
-              <a:t>Dziękujemy </a:t>
-            </a:r>
-            <a:r>
-              <a:rPr lang="pl-PL" smtClean="0"/>
-              <a:t>za uwagę</a:t>
-            </a:r>
-            <a:endParaRPr lang="pl-PL"/>
+              <a:t>Dziękujemy za uwagę</a:t>
+            </a:r>
+            <a:endParaRPr lang="pl-PL" dirty="0"/>
           </a:p>
         </p:txBody>
       </p:sp>

</xml_diff>